<commit_message>
Added deadlock and joining example
</commit_message>
<xml_diff>
--- a/presentation.pptx
+++ b/presentation.pptx
@@ -8,6 +8,15 @@
     <p:sldId id="256" r:id="rId2"/>
     <p:sldId id="257" r:id="rId3"/>
     <p:sldId id="259" r:id="rId4"/>
+    <p:sldId id="260" r:id="rId5"/>
+    <p:sldId id="261" r:id="rId6"/>
+    <p:sldId id="262" r:id="rId7"/>
+    <p:sldId id="263" r:id="rId8"/>
+    <p:sldId id="264" r:id="rId9"/>
+    <p:sldId id="265" r:id="rId10"/>
+    <p:sldId id="266" r:id="rId11"/>
+    <p:sldId id="267" r:id="rId12"/>
+    <p:sldId id="268" r:id="rId13"/>
   </p:sldIdLst>
   <p:sldSz cx="12192000" cy="6858000"/>
   <p:notesSz cx="6858000" cy="9144000"/>
@@ -106,6 +115,11 @@
       </a:defRPr>
     </a:lvl9pPr>
   </p:defaultTextStyle>
+  <p:extLst>
+    <p:ext uri="{EFAFB233-063F-42B5-8137-9DF3F51BA10A}">
+      <p15:sldGuideLst xmlns:p15="http://schemas.microsoft.com/office/powerpoint/2012/main"/>
+    </p:ext>
+  </p:extLst>
 </p:presentation>
 </file>
 
@@ -3366,6 +3380,216 @@
 </p:sld>
 </file>
 
+<file path=ppt/slides/slide10.xml><?xml version="1.0" encoding="utf-8"?>
+<p:sld xmlns:a="http://schemas.openxmlformats.org/drawingml/2006/main" xmlns:r="http://schemas.openxmlformats.org/officeDocument/2006/relationships" xmlns:p="http://schemas.openxmlformats.org/presentationml/2006/main">
+  <p:cSld>
+    <p:spTree>
+      <p:nvGrpSpPr>
+        <p:cNvPr id="1" name=""/>
+        <p:cNvGrpSpPr/>
+        <p:nvPr/>
+      </p:nvGrpSpPr>
+      <p:grpSpPr>
+        <a:xfrm>
+          <a:off x="0" y="0"/>
+          <a:ext cx="0" cy="0"/>
+          <a:chOff x="0" y="0"/>
+          <a:chExt cx="0" cy="0"/>
+        </a:xfrm>
+      </p:grpSpPr>
+      <p:pic>
+        <p:nvPicPr>
+          <p:cNvPr id="3" name="Picture 2">
+            <a:extLst>
+              <a:ext uri="{FF2B5EF4-FFF2-40B4-BE49-F238E27FC236}">
+                <a16:creationId xmlns:a16="http://schemas.microsoft.com/office/drawing/2014/main" id="{4B43C365-A4D4-9782-660B-D9FA08D15EAE}"/>
+              </a:ext>
+            </a:extLst>
+          </p:cNvPr>
+          <p:cNvPicPr>
+            <a:picLocks noChangeAspect="1"/>
+          </p:cNvPicPr>
+          <p:nvPr/>
+        </p:nvPicPr>
+        <p:blipFill>
+          <a:blip r:embed="rId2"/>
+          <a:stretch>
+            <a:fillRect/>
+          </a:stretch>
+        </p:blipFill>
+        <p:spPr>
+          <a:xfrm>
+            <a:off x="828675" y="561975"/>
+            <a:ext cx="10534650" cy="5734050"/>
+          </a:xfrm>
+          <a:prstGeom prst="rect">
+            <a:avLst/>
+          </a:prstGeom>
+        </p:spPr>
+      </p:pic>
+    </p:spTree>
+    <p:extLst>
+      <p:ext uri="{BB962C8B-B14F-4D97-AF65-F5344CB8AC3E}">
+        <p14:creationId xmlns:p14="http://schemas.microsoft.com/office/powerpoint/2010/main" val="3412805167"/>
+      </p:ext>
+    </p:extLst>
+  </p:cSld>
+  <p:clrMapOvr>
+    <a:masterClrMapping/>
+  </p:clrMapOvr>
+</p:sld>
+</file>
+
+<file path=ppt/slides/slide11.xml><?xml version="1.0" encoding="utf-8"?>
+<p:sld xmlns:a="http://schemas.openxmlformats.org/drawingml/2006/main" xmlns:r="http://schemas.openxmlformats.org/officeDocument/2006/relationships" xmlns:p="http://schemas.openxmlformats.org/presentationml/2006/main">
+  <p:cSld>
+    <p:spTree>
+      <p:nvGrpSpPr>
+        <p:cNvPr id="1" name=""/>
+        <p:cNvGrpSpPr/>
+        <p:nvPr/>
+      </p:nvGrpSpPr>
+      <p:grpSpPr>
+        <a:xfrm>
+          <a:off x="0" y="0"/>
+          <a:ext cx="0" cy="0"/>
+          <a:chOff x="0" y="0"/>
+          <a:chExt cx="0" cy="0"/>
+        </a:xfrm>
+      </p:grpSpPr>
+      <p:pic>
+        <p:nvPicPr>
+          <p:cNvPr id="3" name="Picture 2">
+            <a:extLst>
+              <a:ext uri="{FF2B5EF4-FFF2-40B4-BE49-F238E27FC236}">
+                <a16:creationId xmlns:a16="http://schemas.microsoft.com/office/drawing/2014/main" id="{27E55020-B058-F605-3A33-2A9D21D914A3}"/>
+              </a:ext>
+            </a:extLst>
+          </p:cNvPr>
+          <p:cNvPicPr>
+            <a:picLocks noChangeAspect="1"/>
+          </p:cNvPicPr>
+          <p:nvPr/>
+        </p:nvPicPr>
+        <p:blipFill>
+          <a:blip r:embed="rId2"/>
+          <a:stretch>
+            <a:fillRect/>
+          </a:stretch>
+        </p:blipFill>
+        <p:spPr>
+          <a:xfrm>
+            <a:off x="567029" y="273018"/>
+            <a:ext cx="5749795" cy="2356898"/>
+          </a:xfrm>
+          <a:prstGeom prst="rect">
+            <a:avLst/>
+          </a:prstGeom>
+        </p:spPr>
+      </p:pic>
+      <p:pic>
+        <p:nvPicPr>
+          <p:cNvPr id="5" name="Picture 4">
+            <a:extLst>
+              <a:ext uri="{FF2B5EF4-FFF2-40B4-BE49-F238E27FC236}">
+                <a16:creationId xmlns:a16="http://schemas.microsoft.com/office/drawing/2014/main" id="{6FDB808C-1A93-7C0E-43DC-1718DB1C5BB1}"/>
+              </a:ext>
+            </a:extLst>
+          </p:cNvPr>
+          <p:cNvPicPr>
+            <a:picLocks noChangeAspect="1"/>
+          </p:cNvPicPr>
+          <p:nvPr/>
+        </p:nvPicPr>
+        <p:blipFill>
+          <a:blip r:embed="rId3"/>
+          <a:stretch>
+            <a:fillRect/>
+          </a:stretch>
+        </p:blipFill>
+        <p:spPr>
+          <a:xfrm>
+            <a:off x="4894586" y="2730461"/>
+            <a:ext cx="6619390" cy="3520952"/>
+          </a:xfrm>
+          <a:prstGeom prst="rect">
+            <a:avLst/>
+          </a:prstGeom>
+        </p:spPr>
+      </p:pic>
+    </p:spTree>
+    <p:extLst>
+      <p:ext uri="{BB962C8B-B14F-4D97-AF65-F5344CB8AC3E}">
+        <p14:creationId xmlns:p14="http://schemas.microsoft.com/office/powerpoint/2010/main" val="1799706601"/>
+      </p:ext>
+    </p:extLst>
+  </p:cSld>
+  <p:clrMapOvr>
+    <a:masterClrMapping/>
+  </p:clrMapOvr>
+</p:sld>
+</file>
+
+<file path=ppt/slides/slide12.xml><?xml version="1.0" encoding="utf-8"?>
+<p:sld xmlns:a="http://schemas.openxmlformats.org/drawingml/2006/main" xmlns:r="http://schemas.openxmlformats.org/officeDocument/2006/relationships" xmlns:p="http://schemas.openxmlformats.org/presentationml/2006/main">
+  <p:cSld>
+    <p:spTree>
+      <p:nvGrpSpPr>
+        <p:cNvPr id="1" name=""/>
+        <p:cNvGrpSpPr/>
+        <p:nvPr/>
+      </p:nvGrpSpPr>
+      <p:grpSpPr>
+        <a:xfrm>
+          <a:off x="0" y="0"/>
+          <a:ext cx="0" cy="0"/>
+          <a:chOff x="0" y="0"/>
+          <a:chExt cx="0" cy="0"/>
+        </a:xfrm>
+      </p:grpSpPr>
+      <p:pic>
+        <p:nvPicPr>
+          <p:cNvPr id="3" name="Picture 2">
+            <a:extLst>
+              <a:ext uri="{FF2B5EF4-FFF2-40B4-BE49-F238E27FC236}">
+                <a16:creationId xmlns:a16="http://schemas.microsoft.com/office/drawing/2014/main" id="{E0F4D3A4-2A27-7CEB-F7F3-63C4F68E4286}"/>
+              </a:ext>
+            </a:extLst>
+          </p:cNvPr>
+          <p:cNvPicPr>
+            <a:picLocks noChangeAspect="1"/>
+          </p:cNvPicPr>
+          <p:nvPr/>
+        </p:nvPicPr>
+        <p:blipFill>
+          <a:blip r:embed="rId2"/>
+          <a:stretch>
+            <a:fillRect/>
+          </a:stretch>
+        </p:blipFill>
+        <p:spPr>
+          <a:xfrm>
+            <a:off x="995362" y="1838325"/>
+            <a:ext cx="10201275" cy="3181350"/>
+          </a:xfrm>
+          <a:prstGeom prst="rect">
+            <a:avLst/>
+          </a:prstGeom>
+        </p:spPr>
+      </p:pic>
+    </p:spTree>
+    <p:extLst>
+      <p:ext uri="{BB962C8B-B14F-4D97-AF65-F5344CB8AC3E}">
+        <p14:creationId xmlns:p14="http://schemas.microsoft.com/office/powerpoint/2010/main" val="1910506757"/>
+      </p:ext>
+    </p:extLst>
+  </p:cSld>
+  <p:clrMapOvr>
+    <a:masterClrMapping/>
+  </p:clrMapOvr>
+</p:sld>
+</file>
+
 <file path=ppt/slides/slide2.xml><?xml version="1.0" encoding="utf-8"?>
 <p:sld xmlns:a="http://schemas.openxmlformats.org/drawingml/2006/main" xmlns:r="http://schemas.openxmlformats.org/officeDocument/2006/relationships" xmlns:p="http://schemas.openxmlformats.org/presentationml/2006/main">
   <p:cSld>
@@ -3443,10 +3667,430 @@
           <a:chExt cx="0" cy="0"/>
         </a:xfrm>
       </p:grpSpPr>
+      <p:pic>
+        <p:nvPicPr>
+          <p:cNvPr id="3" name="Picture 2">
+            <a:extLst>
+              <a:ext uri="{FF2B5EF4-FFF2-40B4-BE49-F238E27FC236}">
+                <a16:creationId xmlns:a16="http://schemas.microsoft.com/office/drawing/2014/main" id="{1145D09F-35DB-00DA-013E-C1C975E12E43}"/>
+              </a:ext>
+            </a:extLst>
+          </p:cNvPr>
+          <p:cNvPicPr>
+            <a:picLocks noChangeAspect="1"/>
+          </p:cNvPicPr>
+          <p:nvPr/>
+        </p:nvPicPr>
+        <p:blipFill>
+          <a:blip r:embed="rId2"/>
+          <a:stretch>
+            <a:fillRect/>
+          </a:stretch>
+        </p:blipFill>
+        <p:spPr>
+          <a:xfrm>
+            <a:off x="685724" y="0"/>
+            <a:ext cx="10820551" cy="6858000"/>
+          </a:xfrm>
+          <a:prstGeom prst="rect">
+            <a:avLst/>
+          </a:prstGeom>
+        </p:spPr>
+      </p:pic>
     </p:spTree>
     <p:extLst>
       <p:ext uri="{BB962C8B-B14F-4D97-AF65-F5344CB8AC3E}">
         <p14:creationId xmlns:p14="http://schemas.microsoft.com/office/powerpoint/2010/main" val="13758835"/>
+      </p:ext>
+    </p:extLst>
+  </p:cSld>
+  <p:clrMapOvr>
+    <a:masterClrMapping/>
+  </p:clrMapOvr>
+</p:sld>
+</file>
+
+<file path=ppt/slides/slide4.xml><?xml version="1.0" encoding="utf-8"?>
+<p:sld xmlns:a="http://schemas.openxmlformats.org/drawingml/2006/main" xmlns:r="http://schemas.openxmlformats.org/officeDocument/2006/relationships" xmlns:p="http://schemas.openxmlformats.org/presentationml/2006/main">
+  <p:cSld>
+    <p:spTree>
+      <p:nvGrpSpPr>
+        <p:cNvPr id="1" name=""/>
+        <p:cNvGrpSpPr/>
+        <p:nvPr/>
+      </p:nvGrpSpPr>
+      <p:grpSpPr>
+        <a:xfrm>
+          <a:off x="0" y="0"/>
+          <a:ext cx="0" cy="0"/>
+          <a:chOff x="0" y="0"/>
+          <a:chExt cx="0" cy="0"/>
+        </a:xfrm>
+      </p:grpSpPr>
+      <p:pic>
+        <p:nvPicPr>
+          <p:cNvPr id="3" name="Picture 2">
+            <a:extLst>
+              <a:ext uri="{FF2B5EF4-FFF2-40B4-BE49-F238E27FC236}">
+                <a16:creationId xmlns:a16="http://schemas.microsoft.com/office/drawing/2014/main" id="{4B6B88A9-A8E5-6C8B-BE1E-B58A87FE3A0A}"/>
+              </a:ext>
+            </a:extLst>
+          </p:cNvPr>
+          <p:cNvPicPr>
+            <a:picLocks noChangeAspect="1"/>
+          </p:cNvPicPr>
+          <p:nvPr/>
+        </p:nvPicPr>
+        <p:blipFill>
+          <a:blip r:embed="rId2"/>
+          <a:stretch>
+            <a:fillRect/>
+          </a:stretch>
+        </p:blipFill>
+        <p:spPr>
+          <a:xfrm>
+            <a:off x="0" y="64975"/>
+            <a:ext cx="12192000" cy="6728050"/>
+          </a:xfrm>
+          <a:prstGeom prst="rect">
+            <a:avLst/>
+          </a:prstGeom>
+        </p:spPr>
+      </p:pic>
+    </p:spTree>
+    <p:extLst>
+      <p:ext uri="{BB962C8B-B14F-4D97-AF65-F5344CB8AC3E}">
+        <p14:creationId xmlns:p14="http://schemas.microsoft.com/office/powerpoint/2010/main" val="4250263398"/>
+      </p:ext>
+    </p:extLst>
+  </p:cSld>
+  <p:clrMapOvr>
+    <a:masterClrMapping/>
+  </p:clrMapOvr>
+</p:sld>
+</file>
+
+<file path=ppt/slides/slide5.xml><?xml version="1.0" encoding="utf-8"?>
+<p:sld xmlns:a="http://schemas.openxmlformats.org/drawingml/2006/main" xmlns:r="http://schemas.openxmlformats.org/officeDocument/2006/relationships" xmlns:p="http://schemas.openxmlformats.org/presentationml/2006/main">
+  <p:cSld>
+    <p:spTree>
+      <p:nvGrpSpPr>
+        <p:cNvPr id="1" name=""/>
+        <p:cNvGrpSpPr/>
+        <p:nvPr/>
+      </p:nvGrpSpPr>
+      <p:grpSpPr>
+        <a:xfrm>
+          <a:off x="0" y="0"/>
+          <a:ext cx="0" cy="0"/>
+          <a:chOff x="0" y="0"/>
+          <a:chExt cx="0" cy="0"/>
+        </a:xfrm>
+      </p:grpSpPr>
+      <p:pic>
+        <p:nvPicPr>
+          <p:cNvPr id="3" name="Picture 2">
+            <a:extLst>
+              <a:ext uri="{FF2B5EF4-FFF2-40B4-BE49-F238E27FC236}">
+                <a16:creationId xmlns:a16="http://schemas.microsoft.com/office/drawing/2014/main" id="{58E4EA1E-D40E-283A-D2A2-DB00CFC81D25}"/>
+              </a:ext>
+            </a:extLst>
+          </p:cNvPr>
+          <p:cNvPicPr>
+            <a:picLocks noChangeAspect="1"/>
+          </p:cNvPicPr>
+          <p:nvPr/>
+        </p:nvPicPr>
+        <p:blipFill>
+          <a:blip r:embed="rId2"/>
+          <a:stretch>
+            <a:fillRect/>
+          </a:stretch>
+        </p:blipFill>
+        <p:spPr>
+          <a:xfrm>
+            <a:off x="0" y="382754"/>
+            <a:ext cx="12192000" cy="6092491"/>
+          </a:xfrm>
+          <a:prstGeom prst="rect">
+            <a:avLst/>
+          </a:prstGeom>
+        </p:spPr>
+      </p:pic>
+    </p:spTree>
+    <p:extLst>
+      <p:ext uri="{BB962C8B-B14F-4D97-AF65-F5344CB8AC3E}">
+        <p14:creationId xmlns:p14="http://schemas.microsoft.com/office/powerpoint/2010/main" val="374090561"/>
+      </p:ext>
+    </p:extLst>
+  </p:cSld>
+  <p:clrMapOvr>
+    <a:masterClrMapping/>
+  </p:clrMapOvr>
+</p:sld>
+</file>
+
+<file path=ppt/slides/slide6.xml><?xml version="1.0" encoding="utf-8"?>
+<p:sld xmlns:a="http://schemas.openxmlformats.org/drawingml/2006/main" xmlns:r="http://schemas.openxmlformats.org/officeDocument/2006/relationships" xmlns:p="http://schemas.openxmlformats.org/presentationml/2006/main">
+  <p:cSld>
+    <p:spTree>
+      <p:nvGrpSpPr>
+        <p:cNvPr id="1" name=""/>
+        <p:cNvGrpSpPr/>
+        <p:nvPr/>
+      </p:nvGrpSpPr>
+      <p:grpSpPr>
+        <a:xfrm>
+          <a:off x="0" y="0"/>
+          <a:ext cx="0" cy="0"/>
+          <a:chOff x="0" y="0"/>
+          <a:chExt cx="0" cy="0"/>
+        </a:xfrm>
+      </p:grpSpPr>
+      <p:pic>
+        <p:nvPicPr>
+          <p:cNvPr id="3" name="Picture 2">
+            <a:extLst>
+              <a:ext uri="{FF2B5EF4-FFF2-40B4-BE49-F238E27FC236}">
+                <a16:creationId xmlns:a16="http://schemas.microsoft.com/office/drawing/2014/main" id="{3317AFAB-D973-DC69-2677-1C5480173871}"/>
+              </a:ext>
+            </a:extLst>
+          </p:cNvPr>
+          <p:cNvPicPr>
+            <a:picLocks noChangeAspect="1"/>
+          </p:cNvPicPr>
+          <p:nvPr/>
+        </p:nvPicPr>
+        <p:blipFill>
+          <a:blip r:embed="rId2"/>
+          <a:stretch>
+            <a:fillRect/>
+          </a:stretch>
+        </p:blipFill>
+        <p:spPr>
+          <a:xfrm>
+            <a:off x="0" y="439815"/>
+            <a:ext cx="12192000" cy="5978370"/>
+          </a:xfrm>
+          <a:prstGeom prst="rect">
+            <a:avLst/>
+          </a:prstGeom>
+        </p:spPr>
+      </p:pic>
+    </p:spTree>
+    <p:extLst>
+      <p:ext uri="{BB962C8B-B14F-4D97-AF65-F5344CB8AC3E}">
+        <p14:creationId xmlns:p14="http://schemas.microsoft.com/office/powerpoint/2010/main" val="44825868"/>
+      </p:ext>
+    </p:extLst>
+  </p:cSld>
+  <p:clrMapOvr>
+    <a:masterClrMapping/>
+  </p:clrMapOvr>
+</p:sld>
+</file>
+
+<file path=ppt/slides/slide7.xml><?xml version="1.0" encoding="utf-8"?>
+<p:sld xmlns:a="http://schemas.openxmlformats.org/drawingml/2006/main" xmlns:r="http://schemas.openxmlformats.org/officeDocument/2006/relationships" xmlns:p="http://schemas.openxmlformats.org/presentationml/2006/main">
+  <p:cSld>
+    <p:spTree>
+      <p:nvGrpSpPr>
+        <p:cNvPr id="1" name=""/>
+        <p:cNvGrpSpPr/>
+        <p:nvPr/>
+      </p:nvGrpSpPr>
+      <p:grpSpPr>
+        <a:xfrm>
+          <a:off x="0" y="0"/>
+          <a:ext cx="0" cy="0"/>
+          <a:chOff x="0" y="0"/>
+          <a:chExt cx="0" cy="0"/>
+        </a:xfrm>
+      </p:grpSpPr>
+      <p:pic>
+        <p:nvPicPr>
+          <p:cNvPr id="3" name="Picture 2">
+            <a:extLst>
+              <a:ext uri="{FF2B5EF4-FFF2-40B4-BE49-F238E27FC236}">
+                <a16:creationId xmlns:a16="http://schemas.microsoft.com/office/drawing/2014/main" id="{E151DD95-7EBA-B541-B68F-F81E3193DE74}"/>
+              </a:ext>
+            </a:extLst>
+          </p:cNvPr>
+          <p:cNvPicPr>
+            <a:picLocks noChangeAspect="1"/>
+          </p:cNvPicPr>
+          <p:nvPr/>
+        </p:nvPicPr>
+        <p:blipFill>
+          <a:blip r:embed="rId2"/>
+          <a:stretch>
+            <a:fillRect/>
+          </a:stretch>
+        </p:blipFill>
+        <p:spPr>
+          <a:xfrm>
+            <a:off x="1208420" y="0"/>
+            <a:ext cx="9775159" cy="6858000"/>
+          </a:xfrm>
+          <a:prstGeom prst="rect">
+            <a:avLst/>
+          </a:prstGeom>
+        </p:spPr>
+      </p:pic>
+    </p:spTree>
+    <p:extLst>
+      <p:ext uri="{BB962C8B-B14F-4D97-AF65-F5344CB8AC3E}">
+        <p14:creationId xmlns:p14="http://schemas.microsoft.com/office/powerpoint/2010/main" val="2245673100"/>
+      </p:ext>
+    </p:extLst>
+  </p:cSld>
+  <p:clrMapOvr>
+    <a:masterClrMapping/>
+  </p:clrMapOvr>
+</p:sld>
+</file>
+
+<file path=ppt/slides/slide8.xml><?xml version="1.0" encoding="utf-8"?>
+<p:sld xmlns:a="http://schemas.openxmlformats.org/drawingml/2006/main" xmlns:r="http://schemas.openxmlformats.org/officeDocument/2006/relationships" xmlns:p="http://schemas.openxmlformats.org/presentationml/2006/main">
+  <p:cSld>
+    <p:spTree>
+      <p:nvGrpSpPr>
+        <p:cNvPr id="1" name=""/>
+        <p:cNvGrpSpPr/>
+        <p:nvPr/>
+      </p:nvGrpSpPr>
+      <p:grpSpPr>
+        <a:xfrm>
+          <a:off x="0" y="0"/>
+          <a:ext cx="0" cy="0"/>
+          <a:chOff x="0" y="0"/>
+          <a:chExt cx="0" cy="0"/>
+        </a:xfrm>
+      </p:grpSpPr>
+      <p:pic>
+        <p:nvPicPr>
+          <p:cNvPr id="3" name="Picture 2">
+            <a:extLst>
+              <a:ext uri="{FF2B5EF4-FFF2-40B4-BE49-F238E27FC236}">
+                <a16:creationId xmlns:a16="http://schemas.microsoft.com/office/drawing/2014/main" id="{1272A6FC-0FCB-270E-772F-6C88233DB141}"/>
+              </a:ext>
+            </a:extLst>
+          </p:cNvPr>
+          <p:cNvPicPr>
+            <a:picLocks noChangeAspect="1"/>
+          </p:cNvPicPr>
+          <p:nvPr/>
+        </p:nvPicPr>
+        <p:blipFill>
+          <a:blip r:embed="rId2"/>
+          <a:stretch>
+            <a:fillRect/>
+          </a:stretch>
+        </p:blipFill>
+        <p:spPr>
+          <a:xfrm>
+            <a:off x="0" y="0"/>
+            <a:ext cx="6006088" cy="2407298"/>
+          </a:xfrm>
+          <a:prstGeom prst="rect">
+            <a:avLst/>
+          </a:prstGeom>
+        </p:spPr>
+      </p:pic>
+      <p:pic>
+        <p:nvPicPr>
+          <p:cNvPr id="5" name="Picture 4">
+            <a:extLst>
+              <a:ext uri="{FF2B5EF4-FFF2-40B4-BE49-F238E27FC236}">
+                <a16:creationId xmlns:a16="http://schemas.microsoft.com/office/drawing/2014/main" id="{C81E3AC9-E4D3-3B16-DF0A-532298424E5A}"/>
+              </a:ext>
+            </a:extLst>
+          </p:cNvPr>
+          <p:cNvPicPr>
+            <a:picLocks noChangeAspect="1"/>
+          </p:cNvPicPr>
+          <p:nvPr/>
+        </p:nvPicPr>
+        <p:blipFill>
+          <a:blip r:embed="rId3"/>
+          <a:stretch>
+            <a:fillRect/>
+          </a:stretch>
+        </p:blipFill>
+        <p:spPr>
+          <a:xfrm>
+            <a:off x="6006088" y="67204"/>
+            <a:ext cx="5721089" cy="2759972"/>
+          </a:xfrm>
+          <a:prstGeom prst="rect">
+            <a:avLst/>
+          </a:prstGeom>
+        </p:spPr>
+      </p:pic>
+    </p:spTree>
+    <p:extLst>
+      <p:ext uri="{BB962C8B-B14F-4D97-AF65-F5344CB8AC3E}">
+        <p14:creationId xmlns:p14="http://schemas.microsoft.com/office/powerpoint/2010/main" val="3416399895"/>
+      </p:ext>
+    </p:extLst>
+  </p:cSld>
+  <p:clrMapOvr>
+    <a:masterClrMapping/>
+  </p:clrMapOvr>
+</p:sld>
+</file>
+
+<file path=ppt/slides/slide9.xml><?xml version="1.0" encoding="utf-8"?>
+<p:sld xmlns:a="http://schemas.openxmlformats.org/drawingml/2006/main" xmlns:r="http://schemas.openxmlformats.org/officeDocument/2006/relationships" xmlns:p="http://schemas.openxmlformats.org/presentationml/2006/main">
+  <p:cSld>
+    <p:spTree>
+      <p:nvGrpSpPr>
+        <p:cNvPr id="1" name=""/>
+        <p:cNvGrpSpPr/>
+        <p:nvPr/>
+      </p:nvGrpSpPr>
+      <p:grpSpPr>
+        <a:xfrm>
+          <a:off x="0" y="0"/>
+          <a:ext cx="0" cy="0"/>
+          <a:chOff x="0" y="0"/>
+          <a:chExt cx="0" cy="0"/>
+        </a:xfrm>
+      </p:grpSpPr>
+      <p:pic>
+        <p:nvPicPr>
+          <p:cNvPr id="3" name="Picture 2">
+            <a:extLst>
+              <a:ext uri="{FF2B5EF4-FFF2-40B4-BE49-F238E27FC236}">
+                <a16:creationId xmlns:a16="http://schemas.microsoft.com/office/drawing/2014/main" id="{54D70CAD-C0A8-D971-DA5F-F22867006468}"/>
+              </a:ext>
+            </a:extLst>
+          </p:cNvPr>
+          <p:cNvPicPr>
+            <a:picLocks noChangeAspect="1"/>
+          </p:cNvPicPr>
+          <p:nvPr/>
+        </p:nvPicPr>
+        <p:blipFill>
+          <a:blip r:embed="rId2"/>
+          <a:stretch>
+            <a:fillRect/>
+          </a:stretch>
+        </p:blipFill>
+        <p:spPr>
+          <a:xfrm>
+            <a:off x="1028700" y="766762"/>
+            <a:ext cx="10134600" cy="5324475"/>
+          </a:xfrm>
+          <a:prstGeom prst="rect">
+            <a:avLst/>
+          </a:prstGeom>
+        </p:spPr>
+      </p:pic>
+    </p:spTree>
+    <p:extLst>
+      <p:ext uri="{BB962C8B-B14F-4D97-AF65-F5344CB8AC3E}">
+        <p14:creationId xmlns:p14="http://schemas.microsoft.com/office/powerpoint/2010/main" val="2838226801"/>
       </p:ext>
     </p:extLst>
   </p:cSld>

</xml_diff>